<commit_message>
add new example under CBA pressure
</commit_message>
<xml_diff>
--- a/001_FaaS_performance_analysis.pptx
+++ b/001_FaaS_performance_analysis.pptx
@@ -5,10 +5,10 @@
     <p:sldMasterId id="2147483660" r:id="rId1"/>
   </p:sldMasterIdLst>
   <p:notesMasterIdLst>
-    <p:notesMasterId r:id="rId7"/>
+    <p:notesMasterId r:id="rId8"/>
   </p:notesMasterIdLst>
   <p:handoutMasterIdLst>
-    <p:handoutMasterId r:id="rId8"/>
+    <p:handoutMasterId r:id="rId9"/>
   </p:handoutMasterIdLst>
   <p:sldIdLst>
     <p:sldId id="340" r:id="rId2"/>
@@ -16,6 +16,7 @@
     <p:sldId id="358" r:id="rId4"/>
     <p:sldId id="355" r:id="rId5"/>
     <p:sldId id="356" r:id="rId6"/>
+    <p:sldId id="359" r:id="rId7"/>
   </p:sldIdLst>
   <p:sldSz cx="12195175" cy="6859588"/>
   <p:notesSz cx="6797675" cy="9874250"/>
@@ -7706,6 +7707,521 @@
       <p:transition spd="slow"/>
     </mc:Fallback>
   </mc:AlternateContent>
+  <p:timing>
+    <p:tnLst>
+      <p:par>
+        <p:cTn id="1" dur="indefinite" restart="never" nodeType="tmRoot"/>
+      </p:par>
+    </p:tnLst>
+  </p:timing>
+</p:sld>
+</file>
+
+<file path=ppt/slides/slide6.xml><?xml version="1.0" encoding="utf-8"?>
+<p:sld xmlns:a="http://schemas.openxmlformats.org/drawingml/2006/main" xmlns:r="http://schemas.openxmlformats.org/officeDocument/2006/relationships" xmlns:p="http://schemas.openxmlformats.org/presentationml/2006/main">
+  <p:cSld>
+    <p:spTree>
+      <p:nvGrpSpPr>
+        <p:cNvPr id="1" name=""/>
+        <p:cNvGrpSpPr/>
+        <p:nvPr/>
+      </p:nvGrpSpPr>
+      <p:grpSpPr>
+        <a:xfrm>
+          <a:off x="0" y="0"/>
+          <a:ext cx="0" cy="0"/>
+          <a:chOff x="0" y="0"/>
+          <a:chExt cx="0" cy="0"/>
+        </a:xfrm>
+      </p:grpSpPr>
+      <p:sp>
+        <p:nvSpPr>
+          <p:cNvPr id="2" name="Title 1"/>
+          <p:cNvSpPr>
+            <a:spLocks noGrp="1"/>
+          </p:cNvSpPr>
+          <p:nvPr>
+            <p:ph type="title"/>
+          </p:nvPr>
+        </p:nvSpPr>
+        <p:spPr/>
+        <p:txBody>
+          <a:bodyPr/>
+          <a:lstStyle/>
+          <a:p>
+            <a:endParaRPr lang="en-US"/>
+          </a:p>
+        </p:txBody>
+      </p:sp>
+      <p:sp>
+        <p:nvSpPr>
+          <p:cNvPr id="5" name="Rectangle 4"/>
+          <p:cNvSpPr/>
+          <p:nvPr/>
+        </p:nvSpPr>
+        <p:spPr bwMode="gray">
+          <a:xfrm>
+            <a:off x="1149179" y="1984287"/>
+            <a:ext cx="3113902" cy="276999"/>
+          </a:xfrm>
+          <a:prstGeom prst="rect">
+            <a:avLst/>
+          </a:prstGeom>
+          <a:solidFill>
+            <a:schemeClr val="accent1"/>
+          </a:solidFill>
+          <a:ln w="6350" algn="ctr">
+            <a:noFill/>
+            <a:miter lim="800000"/>
+            <a:headEnd/>
+            <a:tailEnd/>
+          </a:ln>
+        </p:spPr>
+        <p:txBody>
+          <a:bodyPr lIns="90000" tIns="72000" rIns="90000" bIns="72000" rtlCol="0" anchor="ctr"/>
+          <a:lstStyle/>
+          <a:p>
+            <a:pPr marR="0" algn="ctr" defTabSz="914400" eaLnBrk="1" fontAlgn="base" latinLnBrk="0" hangingPunct="1">
+              <a:lnSpc>
+                <a:spcPct val="100000"/>
+              </a:lnSpc>
+              <a:spcBef>
+                <a:spcPct val="50000"/>
+              </a:spcBef>
+              <a:spcAft>
+                <a:spcPct val="0"/>
+              </a:spcAft>
+              <a:buClr>
+                <a:srgbClr val="F0AB00"/>
+              </a:buClr>
+              <a:buSzPct val="80000"/>
+              <a:tabLst/>
+            </a:pPr>
+            <a:endParaRPr kumimoji="0" lang="en-US" sz="2000" b="0" i="0" u="none" strike="noStrike" kern="0" cap="none" spc="0" normalizeH="0" baseline="0" noProof="0" dirty="0" err="1" smtClean="0">
+              <a:ln>
+                <a:noFill/>
+              </a:ln>
+              <a:effectLst/>
+              <a:uLnTx/>
+              <a:uFillTx/>
+              <a:ea typeface="Arial Unicode MS" pitchFamily="34" charset="-128"/>
+              <a:cs typeface="Arial Unicode MS" pitchFamily="34" charset="-128"/>
+            </a:endParaRPr>
+          </a:p>
+        </p:txBody>
+      </p:sp>
+      <p:sp>
+        <p:nvSpPr>
+          <p:cNvPr id="6" name="Rectangle 5"/>
+          <p:cNvSpPr/>
+          <p:nvPr/>
+        </p:nvSpPr>
+        <p:spPr bwMode="gray">
+          <a:xfrm>
+            <a:off x="1729946" y="2681416"/>
+            <a:ext cx="2174789" cy="296562"/>
+          </a:xfrm>
+          <a:prstGeom prst="rect">
+            <a:avLst/>
+          </a:prstGeom>
+          <a:solidFill>
+            <a:schemeClr val="accent1"/>
+          </a:solidFill>
+          <a:ln w="6350" algn="ctr">
+            <a:noFill/>
+            <a:miter lim="800000"/>
+            <a:headEnd/>
+            <a:tailEnd/>
+          </a:ln>
+        </p:spPr>
+        <p:txBody>
+          <a:bodyPr lIns="90000" tIns="72000" rIns="90000" bIns="72000" rtlCol="0" anchor="ctr"/>
+          <a:lstStyle/>
+          <a:p>
+            <a:pPr marR="0" algn="ctr" defTabSz="914400" eaLnBrk="1" fontAlgn="base" latinLnBrk="0" hangingPunct="1">
+              <a:lnSpc>
+                <a:spcPct val="100000"/>
+              </a:lnSpc>
+              <a:spcBef>
+                <a:spcPct val="50000"/>
+              </a:spcBef>
+              <a:spcAft>
+                <a:spcPct val="0"/>
+              </a:spcAft>
+              <a:buClr>
+                <a:srgbClr val="F0AB00"/>
+              </a:buClr>
+              <a:buSzPct val="80000"/>
+              <a:tabLst/>
+            </a:pPr>
+            <a:endParaRPr kumimoji="0" lang="en-US" sz="2000" b="0" i="0" u="none" strike="noStrike" kern="0" cap="none" spc="0" normalizeH="0" baseline="0" noProof="0" dirty="0" err="1" smtClean="0">
+              <a:ln>
+                <a:noFill/>
+              </a:ln>
+              <a:effectLst/>
+              <a:uLnTx/>
+              <a:uFillTx/>
+              <a:ea typeface="Arial Unicode MS" pitchFamily="34" charset="-128"/>
+              <a:cs typeface="Arial Unicode MS" pitchFamily="34" charset="-128"/>
+            </a:endParaRPr>
+          </a:p>
+        </p:txBody>
+      </p:sp>
+      <p:cxnSp>
+        <p:nvCxnSpPr>
+          <p:cNvPr id="9" name="Straight Arrow Connector 8"/>
+          <p:cNvCxnSpPr/>
+          <p:nvPr/>
+        </p:nvCxnSpPr>
+        <p:spPr>
+          <a:xfrm flipV="1">
+            <a:off x="944880" y="4284575"/>
+            <a:ext cx="8778240" cy="35140"/>
+          </a:xfrm>
+          <a:prstGeom prst="straightConnector1">
+            <a:avLst/>
+          </a:prstGeom>
+          <a:ln>
+            <a:tailEnd type="triangle"/>
+          </a:ln>
+        </p:spPr>
+        <p:style>
+          <a:lnRef idx="2">
+            <a:schemeClr val="accent1"/>
+          </a:lnRef>
+          <a:fillRef idx="0">
+            <a:schemeClr val="accent1"/>
+          </a:fillRef>
+          <a:effectRef idx="1">
+            <a:schemeClr val="accent1"/>
+          </a:effectRef>
+          <a:fontRef idx="minor">
+            <a:schemeClr val="tx1"/>
+          </a:fontRef>
+        </p:style>
+      </p:cxnSp>
+      <p:cxnSp>
+        <p:nvCxnSpPr>
+          <p:cNvPr id="11" name="Straight Connector 10"/>
+          <p:cNvCxnSpPr/>
+          <p:nvPr/>
+        </p:nvCxnSpPr>
+        <p:spPr>
+          <a:xfrm>
+            <a:off x="1149179" y="2261286"/>
+            <a:ext cx="0" cy="2040859"/>
+          </a:xfrm>
+          <a:prstGeom prst="line">
+            <a:avLst/>
+          </a:prstGeom>
+          <a:ln w="6350">
+            <a:solidFill>
+              <a:schemeClr val="tx1"/>
+            </a:solidFill>
+            <a:prstDash val="sysDot"/>
+          </a:ln>
+        </p:spPr>
+        <p:style>
+          <a:lnRef idx="1">
+            <a:schemeClr val="accent1"/>
+          </a:lnRef>
+          <a:fillRef idx="0">
+            <a:schemeClr val="accent1"/>
+          </a:fillRef>
+          <a:effectRef idx="0">
+            <a:schemeClr val="accent1"/>
+          </a:effectRef>
+          <a:fontRef idx="minor">
+            <a:schemeClr val="tx1"/>
+          </a:fontRef>
+        </p:style>
+      </p:cxnSp>
+      <p:sp>
+        <p:nvSpPr>
+          <p:cNvPr id="14" name="TextBox 13"/>
+          <p:cNvSpPr txBox="1"/>
+          <p:nvPr/>
+        </p:nvSpPr>
+        <p:spPr>
+          <a:xfrm>
+            <a:off x="1729946" y="4302145"/>
+            <a:ext cx="407773" cy="276999"/>
+          </a:xfrm>
+          <a:prstGeom prst="rect">
+            <a:avLst/>
+          </a:prstGeom>
+          <a:noFill/>
+        </p:spPr>
+        <p:txBody>
+          <a:bodyPr wrap="square" lIns="0" tIns="0" rIns="0" bIns="0" rtlCol="0">
+            <a:spAutoFit/>
+          </a:bodyPr>
+          <a:lstStyle/>
+          <a:p>
+            <a:pPr fontAlgn="base">
+              <a:spcBef>
+                <a:spcPts val="600"/>
+              </a:spcBef>
+              <a:spcAft>
+                <a:spcPct val="0"/>
+              </a:spcAft>
+              <a:buClr>
+                <a:srgbClr val="F0AB00"/>
+              </a:buClr>
+              <a:buSzPct val="80000"/>
+            </a:pPr>
+            <a:r>
+              <a:rPr lang="en-US" sz="1800" kern="0" dirty="0" smtClean="0">
+                <a:ea typeface="Arial Unicode MS" pitchFamily="34" charset="-128"/>
+                <a:cs typeface="Arial Unicode MS" pitchFamily="34" charset="-128"/>
+              </a:rPr>
+              <a:t>t2</a:t>
+            </a:r>
+            <a:endParaRPr lang="en-US" sz="1800" kern="0" dirty="0" smtClean="0">
+              <a:ea typeface="Arial Unicode MS" pitchFamily="34" charset="-128"/>
+              <a:cs typeface="Arial Unicode MS" pitchFamily="34" charset="-128"/>
+            </a:endParaRPr>
+          </a:p>
+        </p:txBody>
+      </p:sp>
+      <p:sp>
+        <p:nvSpPr>
+          <p:cNvPr id="16" name="TextBox 15"/>
+          <p:cNvSpPr txBox="1"/>
+          <p:nvPr/>
+        </p:nvSpPr>
+        <p:spPr>
+          <a:xfrm>
+            <a:off x="9008076" y="4302145"/>
+            <a:ext cx="1198605" cy="276999"/>
+          </a:xfrm>
+          <a:prstGeom prst="rect">
+            <a:avLst/>
+          </a:prstGeom>
+          <a:noFill/>
+        </p:spPr>
+        <p:txBody>
+          <a:bodyPr wrap="square" lIns="0" tIns="0" rIns="0" bIns="0" rtlCol="0">
+            <a:spAutoFit/>
+          </a:bodyPr>
+          <a:lstStyle/>
+          <a:p>
+            <a:pPr fontAlgn="base">
+              <a:spcBef>
+                <a:spcPts val="600"/>
+              </a:spcBef>
+              <a:spcAft>
+                <a:spcPct val="0"/>
+              </a:spcAft>
+              <a:buClr>
+                <a:srgbClr val="F0AB00"/>
+              </a:buClr>
+              <a:buSzPct val="80000"/>
+            </a:pPr>
+            <a:r>
+              <a:rPr lang="en-US" sz="1800" kern="0" dirty="0" smtClean="0">
+                <a:ea typeface="Arial Unicode MS" pitchFamily="34" charset="-128"/>
+                <a:cs typeface="Arial Unicode MS" pitchFamily="34" charset="-128"/>
+              </a:rPr>
+              <a:t>Time</a:t>
+            </a:r>
+            <a:endParaRPr lang="en-US" sz="1800" kern="0" dirty="0" smtClean="0">
+              <a:ea typeface="Arial Unicode MS" pitchFamily="34" charset="-128"/>
+              <a:cs typeface="Arial Unicode MS" pitchFamily="34" charset="-128"/>
+            </a:endParaRPr>
+          </a:p>
+        </p:txBody>
+      </p:sp>
+      <p:sp>
+        <p:nvSpPr>
+          <p:cNvPr id="18" name="TextBox 17"/>
+          <p:cNvSpPr txBox="1"/>
+          <p:nvPr/>
+        </p:nvSpPr>
+        <p:spPr>
+          <a:xfrm>
+            <a:off x="1149179" y="4284575"/>
+            <a:ext cx="395417" cy="276999"/>
+          </a:xfrm>
+          <a:prstGeom prst="rect">
+            <a:avLst/>
+          </a:prstGeom>
+          <a:noFill/>
+        </p:spPr>
+        <p:txBody>
+          <a:bodyPr wrap="square" lIns="0" tIns="0" rIns="0" bIns="0" rtlCol="0">
+            <a:spAutoFit/>
+          </a:bodyPr>
+          <a:lstStyle/>
+          <a:p>
+            <a:pPr fontAlgn="base">
+              <a:spcBef>
+                <a:spcPts val="600"/>
+              </a:spcBef>
+              <a:spcAft>
+                <a:spcPct val="0"/>
+              </a:spcAft>
+              <a:buClr>
+                <a:srgbClr val="F0AB00"/>
+              </a:buClr>
+              <a:buSzPct val="80000"/>
+            </a:pPr>
+            <a:r>
+              <a:rPr lang="en-US" sz="1800" kern="0" dirty="0" smtClean="0">
+                <a:ea typeface="Arial Unicode MS" pitchFamily="34" charset="-128"/>
+                <a:cs typeface="Arial Unicode MS" pitchFamily="34" charset="-128"/>
+              </a:rPr>
+              <a:t>t1</a:t>
+            </a:r>
+            <a:endParaRPr lang="en-US" sz="1800" kern="0" dirty="0" smtClean="0">
+              <a:ea typeface="Arial Unicode MS" pitchFamily="34" charset="-128"/>
+              <a:cs typeface="Arial Unicode MS" pitchFamily="34" charset="-128"/>
+            </a:endParaRPr>
+          </a:p>
+        </p:txBody>
+      </p:sp>
+      <p:cxnSp>
+        <p:nvCxnSpPr>
+          <p:cNvPr id="19" name="Straight Connector 18"/>
+          <p:cNvCxnSpPr/>
+          <p:nvPr/>
+        </p:nvCxnSpPr>
+        <p:spPr>
+          <a:xfrm>
+            <a:off x="1729946" y="2829697"/>
+            <a:ext cx="0" cy="1454878"/>
+          </a:xfrm>
+          <a:prstGeom prst="line">
+            <a:avLst/>
+          </a:prstGeom>
+          <a:ln w="6350">
+            <a:solidFill>
+              <a:schemeClr val="tx1"/>
+            </a:solidFill>
+            <a:prstDash val="sysDot"/>
+          </a:ln>
+        </p:spPr>
+        <p:style>
+          <a:lnRef idx="1">
+            <a:schemeClr val="accent1"/>
+          </a:lnRef>
+          <a:fillRef idx="0">
+            <a:schemeClr val="accent1"/>
+          </a:fillRef>
+          <a:effectRef idx="0">
+            <a:schemeClr val="accent1"/>
+          </a:effectRef>
+          <a:fontRef idx="minor">
+            <a:schemeClr val="tx1"/>
+          </a:fontRef>
+        </p:style>
+      </p:cxnSp>
+      <p:sp>
+        <p:nvSpPr>
+          <p:cNvPr id="21" name="TextBox 20"/>
+          <p:cNvSpPr txBox="1"/>
+          <p:nvPr/>
+        </p:nvSpPr>
+        <p:spPr>
+          <a:xfrm>
+            <a:off x="3200400" y="1984287"/>
+            <a:ext cx="8668800" cy="276999"/>
+          </a:xfrm>
+          <a:prstGeom prst="rect">
+            <a:avLst/>
+          </a:prstGeom>
+          <a:noFill/>
+        </p:spPr>
+        <p:txBody>
+          <a:bodyPr wrap="square" lIns="0" tIns="0" rIns="0" bIns="0" rtlCol="0">
+            <a:spAutoFit/>
+          </a:bodyPr>
+          <a:lstStyle/>
+          <a:p>
+            <a:pPr fontAlgn="base">
+              <a:spcBef>
+                <a:spcPts val="600"/>
+              </a:spcBef>
+              <a:spcAft>
+                <a:spcPct val="0"/>
+              </a:spcAft>
+              <a:buClr>
+                <a:srgbClr val="F0AB00"/>
+              </a:buClr>
+              <a:buSzPct val="80000"/>
+            </a:pPr>
+            <a:r>
+              <a:rPr lang="en-US" sz="1800" kern="0" dirty="0" smtClean="0">
+                <a:ea typeface="Arial Unicode MS" pitchFamily="34" charset="-128"/>
+                <a:cs typeface="Arial Unicode MS" pitchFamily="34" charset="-128"/>
+              </a:rPr>
+              <a:t>                  Batch request(technical detail, user status, user priority )</a:t>
+            </a:r>
+            <a:endParaRPr lang="en-US" sz="1800" kern="0" dirty="0" smtClean="0">
+              <a:ea typeface="Arial Unicode MS" pitchFamily="34" charset="-128"/>
+              <a:cs typeface="Arial Unicode MS" pitchFamily="34" charset="-128"/>
+            </a:endParaRPr>
+          </a:p>
+        </p:txBody>
+      </p:sp>
+      <p:sp>
+        <p:nvSpPr>
+          <p:cNvPr id="23" name="TextBox 22"/>
+          <p:cNvSpPr txBox="1"/>
+          <p:nvPr/>
+        </p:nvSpPr>
+        <p:spPr>
+          <a:xfrm>
+            <a:off x="3904735" y="2681416"/>
+            <a:ext cx="3113903" cy="276999"/>
+          </a:xfrm>
+          <a:prstGeom prst="rect">
+            <a:avLst/>
+          </a:prstGeom>
+          <a:noFill/>
+        </p:spPr>
+        <p:txBody>
+          <a:bodyPr wrap="square" lIns="0" tIns="0" rIns="0" bIns="0" rtlCol="0">
+            <a:spAutoFit/>
+          </a:bodyPr>
+          <a:lstStyle/>
+          <a:p>
+            <a:pPr fontAlgn="base">
+              <a:spcBef>
+                <a:spcPts val="600"/>
+              </a:spcBef>
+              <a:spcAft>
+                <a:spcPct val="0"/>
+              </a:spcAft>
+              <a:buClr>
+                <a:srgbClr val="F0AB00"/>
+              </a:buClr>
+              <a:buSzPct val="80000"/>
+            </a:pPr>
+            <a:r>
+              <a:rPr lang="en-US" sz="1800" kern="0" dirty="0" smtClean="0">
+                <a:ea typeface="Arial Unicode MS" pitchFamily="34" charset="-128"/>
+                <a:cs typeface="Arial Unicode MS" pitchFamily="34" charset="-128"/>
+              </a:rPr>
+              <a:t>Task list retrieval</a:t>
+            </a:r>
+            <a:endParaRPr lang="en-US" sz="1800" kern="0" dirty="0" smtClean="0">
+              <a:ea typeface="Arial Unicode MS" pitchFamily="34" charset="-128"/>
+              <a:cs typeface="Arial Unicode MS" pitchFamily="34" charset="-128"/>
+            </a:endParaRPr>
+          </a:p>
+        </p:txBody>
+      </p:sp>
+    </p:spTree>
+    <p:extLst>
+      <p:ext uri="{BB962C8B-B14F-4D97-AF65-F5344CB8AC3E}">
+        <p14:creationId xmlns:p14="http://schemas.microsoft.com/office/powerpoint/2010/main" val="2490825785"/>
+      </p:ext>
+    </p:extLst>
+  </p:cSld>
+  <p:clrMapOvr>
+    <a:masterClrMapping/>
+  </p:clrMapOvr>
   <p:timing>
     <p:tnLst>
       <p:par>

</xml_diff>